<commit_message>
Adding react library to be included locally
Adding react and react-don libraries to be included locally
</commit_message>
<xml_diff>
--- a/MedicalVision.pptx
+++ b/MedicalVision.pptx
@@ -3766,12 +3766,12 @@
         </p:nvCxnSpPr>
         <p:spPr>
           <a:xfrm rot="10800000" flipH="1" flipV="1">
-            <a:off x="357665" y="1417638"/>
-            <a:ext cx="99535" cy="1891904"/>
+            <a:off x="357666" y="1417638"/>
+            <a:ext cx="99534" cy="1891904"/>
           </a:xfrm>
           <a:prstGeom prst="curvedConnector4">
             <a:avLst>
-              <a:gd name="adj1" fmla="val -229668"/>
+              <a:gd name="adj1" fmla="val -229670"/>
               <a:gd name="adj2" fmla="val 53660"/>
             </a:avLst>
           </a:prstGeom>
@@ -3803,7 +3803,7 @@
         <p:spPr>
           <a:xfrm>
             <a:off x="357666" y="1279138"/>
-            <a:ext cx="2700304" cy="276999"/>
+            <a:ext cx="3995805" cy="276999"/>
           </a:xfrm>
           <a:prstGeom prst="rect">
             <a:avLst/>
@@ -3842,8 +3842,13 @@
           <a:p>
             <a:r>
               <a:rPr lang="en-US" dirty="0"/>
-              <a:t>Quick jump to specific component panel</a:t>
-            </a:r>
+              <a:t>Quick jump to specific component </a:t>
+            </a:r>
+            <a:r>
+              <a:rPr lang="en-US" dirty="0" smtClean="0"/>
+              <a:t>panel or opens it if closed</a:t>
+            </a:r>
+            <a:endParaRPr lang="en-US" dirty="0"/>
           </a:p>
         </p:txBody>
       </p:sp>

</xml_diff>